<commit_message>
Cleaning up old files
</commit_message>
<xml_diff>
--- a/misc/pwpt.pptx
+++ b/misc/pwpt.pptx
@@ -6,8 +6,10 @@
   </p:sldMasterIdLst>
   <p:sldIdLst>
     <p:sldId id="256" r:id="rId2"/>
-    <p:sldId id="257" r:id="rId3"/>
-    <p:sldId id="258" r:id="rId4"/>
+    <p:sldId id="260" r:id="rId3"/>
+    <p:sldId id="259" r:id="rId4"/>
+    <p:sldId id="257" r:id="rId5"/>
+    <p:sldId id="258" r:id="rId6"/>
   </p:sldIdLst>
   <p:sldSz cx="12192000" cy="6858000"/>
   <p:notesSz cx="6858000" cy="9144000"/>
@@ -106,6 +108,11 @@
       </a:defRPr>
     </a:lvl9pPr>
   </p:defaultTextStyle>
+  <p:extLst>
+    <p:ext uri="{EFAFB233-063F-42B5-8137-9DF3F51BA10A}">
+      <p15:sldGuideLst xmlns:p15="http://schemas.microsoft.com/office/powerpoint/2012/main"/>
+    </p:ext>
+  </p:extLst>
 </p:presentation>
 </file>
 
@@ -258,7 +265,7 @@
           <a:p>
             <a:fld id="{77944B79-8624-644A-AA25-36D8E40F245B}" type="datetimeFigureOut">
               <a:rPr lang="en-AU" smtClean="0"/>
-              <a:t>29/5/2024</a:t>
+              <a:t>30/5/2024</a:t>
             </a:fld>
             <a:endParaRPr lang="en-AU"/>
           </a:p>
@@ -458,7 +465,7 @@
           <a:p>
             <a:fld id="{77944B79-8624-644A-AA25-36D8E40F245B}" type="datetimeFigureOut">
               <a:rPr lang="en-AU" smtClean="0"/>
-              <a:t>29/5/2024</a:t>
+              <a:t>30/5/2024</a:t>
             </a:fld>
             <a:endParaRPr lang="en-AU"/>
           </a:p>
@@ -668,7 +675,7 @@
           <a:p>
             <a:fld id="{77944B79-8624-644A-AA25-36D8E40F245B}" type="datetimeFigureOut">
               <a:rPr lang="en-AU" smtClean="0"/>
-              <a:t>29/5/2024</a:t>
+              <a:t>30/5/2024</a:t>
             </a:fld>
             <a:endParaRPr lang="en-AU"/>
           </a:p>
@@ -868,7 +875,7 @@
           <a:p>
             <a:fld id="{77944B79-8624-644A-AA25-36D8E40F245B}" type="datetimeFigureOut">
               <a:rPr lang="en-AU" smtClean="0"/>
-              <a:t>29/5/2024</a:t>
+              <a:t>30/5/2024</a:t>
             </a:fld>
             <a:endParaRPr lang="en-AU"/>
           </a:p>
@@ -1144,7 +1151,7 @@
           <a:p>
             <a:fld id="{77944B79-8624-644A-AA25-36D8E40F245B}" type="datetimeFigureOut">
               <a:rPr lang="en-AU" smtClean="0"/>
-              <a:t>29/5/2024</a:t>
+              <a:t>30/5/2024</a:t>
             </a:fld>
             <a:endParaRPr lang="en-AU"/>
           </a:p>
@@ -1412,7 +1419,7 @@
           <a:p>
             <a:fld id="{77944B79-8624-644A-AA25-36D8E40F245B}" type="datetimeFigureOut">
               <a:rPr lang="en-AU" smtClean="0"/>
-              <a:t>29/5/2024</a:t>
+              <a:t>30/5/2024</a:t>
             </a:fld>
             <a:endParaRPr lang="en-AU"/>
           </a:p>
@@ -1827,7 +1834,7 @@
           <a:p>
             <a:fld id="{77944B79-8624-644A-AA25-36D8E40F245B}" type="datetimeFigureOut">
               <a:rPr lang="en-AU" smtClean="0"/>
-              <a:t>29/5/2024</a:t>
+              <a:t>30/5/2024</a:t>
             </a:fld>
             <a:endParaRPr lang="en-AU"/>
           </a:p>
@@ -1969,7 +1976,7 @@
           <a:p>
             <a:fld id="{77944B79-8624-644A-AA25-36D8E40F245B}" type="datetimeFigureOut">
               <a:rPr lang="en-AU" smtClean="0"/>
-              <a:t>29/5/2024</a:t>
+              <a:t>30/5/2024</a:t>
             </a:fld>
             <a:endParaRPr lang="en-AU"/>
           </a:p>
@@ -2082,7 +2089,7 @@
           <a:p>
             <a:fld id="{77944B79-8624-644A-AA25-36D8E40F245B}" type="datetimeFigureOut">
               <a:rPr lang="en-AU" smtClean="0"/>
-              <a:t>29/5/2024</a:t>
+              <a:t>30/5/2024</a:t>
             </a:fld>
             <a:endParaRPr lang="en-AU"/>
           </a:p>
@@ -2395,7 +2402,7 @@
           <a:p>
             <a:fld id="{77944B79-8624-644A-AA25-36D8E40F245B}" type="datetimeFigureOut">
               <a:rPr lang="en-AU" smtClean="0"/>
-              <a:t>29/5/2024</a:t>
+              <a:t>30/5/2024</a:t>
             </a:fld>
             <a:endParaRPr lang="en-AU"/>
           </a:p>
@@ -2684,7 +2691,7 @@
           <a:p>
             <a:fld id="{77944B79-8624-644A-AA25-36D8E40F245B}" type="datetimeFigureOut">
               <a:rPr lang="en-AU" smtClean="0"/>
-              <a:t>29/5/2024</a:t>
+              <a:t>30/5/2024</a:t>
             </a:fld>
             <a:endParaRPr lang="en-AU"/>
           </a:p>
@@ -2927,7 +2934,7 @@
           <a:p>
             <a:fld id="{77944B79-8624-644A-AA25-36D8E40F245B}" type="datetimeFigureOut">
               <a:rPr lang="en-AU" smtClean="0"/>
-              <a:t>29/5/2024</a:t>
+              <a:t>30/5/2024</a:t>
             </a:fld>
             <a:endParaRPr lang="en-AU"/>
           </a:p>
@@ -3373,7 +3380,7 @@
         </p:blipFill>
         <p:spPr>
           <a:xfrm>
-            <a:off x="4014672" y="1039565"/>
+            <a:off x="3895800" y="1039565"/>
             <a:ext cx="3659583" cy="3797916"/>
           </a:xfrm>
           <a:prstGeom prst="rect">
@@ -3491,6 +3498,559 @@
 </file>
 
 <file path=ppt/slides/slide2.xml><?xml version="1.0" encoding="utf-8"?>
+<p:sld xmlns:a="http://schemas.openxmlformats.org/drawingml/2006/main" xmlns:r="http://schemas.openxmlformats.org/officeDocument/2006/relationships" xmlns:p="http://schemas.openxmlformats.org/presentationml/2006/main">
+  <p:cSld>
+    <p:spTree>
+      <p:nvGrpSpPr>
+        <p:cNvPr id="1" name=""/>
+        <p:cNvGrpSpPr/>
+        <p:nvPr/>
+      </p:nvGrpSpPr>
+      <p:grpSpPr>
+        <a:xfrm>
+          <a:off x="0" y="0"/>
+          <a:ext cx="0" cy="0"/>
+          <a:chOff x="0" y="0"/>
+          <a:chExt cx="0" cy="0"/>
+        </a:xfrm>
+      </p:grpSpPr>
+      <p:pic>
+        <p:nvPicPr>
+          <p:cNvPr id="5" name="Picture 4" descr="A logo of a tree&#10;&#10;Description automatically generated">
+            <a:extLst>
+              <a:ext uri="{FF2B5EF4-FFF2-40B4-BE49-F238E27FC236}">
+                <a16:creationId xmlns:a16="http://schemas.microsoft.com/office/drawing/2014/main" id="{0AA52284-72D3-3DA1-D1AD-F4867EF202DC}"/>
+              </a:ext>
+            </a:extLst>
+          </p:cNvPr>
+          <p:cNvPicPr>
+            <a:picLocks noChangeAspect="1"/>
+          </p:cNvPicPr>
+          <p:nvPr/>
+        </p:nvPicPr>
+        <p:blipFill rotWithShape="1">
+          <a:blip r:embed="rId2">
+            <a:extLst>
+              <a:ext uri="{BEBA8EAE-BF5A-486C-A8C5-ECC9F3942E4B}">
+                <a14:imgProps xmlns:a14="http://schemas.microsoft.com/office/drawing/2010/main">
+                  <a14:imgLayer r:embed="rId3">
+                    <a14:imgEffect>
+                      <a14:backgroundRemoval t="24121" b="75000" l="15723" r="73926">
+                        <a14:foregroundMark x1="26172" y1="67480" x2="26172" y2="67480"/>
+                        <a14:foregroundMark x1="27832" y1="71680" x2="27832" y2="71680"/>
+                        <a14:foregroundMark x1="39453" y1="60156" x2="39453" y2="60156"/>
+                        <a14:foregroundMark x1="38379" y1="59082" x2="38379" y2="59082"/>
+                        <a14:foregroundMark x1="38184" y1="58789" x2="38184" y2="58789"/>
+                        <a14:foregroundMark x1="38086" y1="58398" x2="38086" y2="58398"/>
+                        <a14:foregroundMark x1="38379" y1="58984" x2="38379" y2="58984"/>
+                        <a14:foregroundMark x1="72559" y1="68262" x2="72559" y2="68262"/>
+                        <a14:foregroundMark x1="73926" y1="67871" x2="73926" y2="67871"/>
+                        <a14:foregroundMark x1="60938" y1="42871" x2="60938" y2="42871"/>
+                        <a14:foregroundMark x1="63965" y1="40039" x2="63965" y2="40039"/>
+                        <a14:foregroundMark x1="62109" y1="46680" x2="62109" y2="46680"/>
+                        <a14:foregroundMark x1="68066" y1="51270" x2="68066" y2="51270"/>
+                        <a14:foregroundMark x1="55859" y1="31543" x2="55859" y2="31543"/>
+                        <a14:foregroundMark x1="53418" y1="35449" x2="53418" y2="35449"/>
+                        <a14:foregroundMark x1="42871" y1="31250" x2="42871" y2="31250"/>
+                        <a14:foregroundMark x1="45508" y1="35449" x2="45508" y2="35449"/>
+                        <a14:foregroundMark x1="33789" y1="39160" x2="33789" y2="39160"/>
+                        <a14:foregroundMark x1="37500" y1="43359" x2="37500" y2="43359"/>
+                        <a14:foregroundMark x1="36426" y1="47168" x2="36426" y2="47168"/>
+                        <a14:foregroundMark x1="31152" y1="50781" x2="31152" y2="50781"/>
+                        <a14:foregroundMark x1="36621" y1="74121" x2="36621" y2="74121"/>
+                        <a14:foregroundMark x1="45605" y1="75000" x2="45605" y2="75000"/>
+                        <a14:foregroundMark x1="32813" y1="58887" x2="32813" y2="58887"/>
+                        <a14:foregroundMark x1="30273" y1="58008" x2="27441" y2="48828"/>
+                        <a14:foregroundMark x1="27441" y1="48828" x2="28418" y2="34668"/>
+                        <a14:foregroundMark x1="28418" y1="34668" x2="30469" y2="31836"/>
+                        <a14:foregroundMark x1="25154" y1="33789" x2="27930" y2="28320"/>
+                        <a14:foregroundMark x1="27930" y1="28320" x2="34961" y2="24902"/>
+                        <a14:foregroundMark x1="60656" y1="24256" x2="64941" y2="25391"/>
+                        <a14:foregroundMark x1="64941" y1="25391" x2="70898" y2="29102"/>
+                        <a14:foregroundMark x1="70898" y1="29102" x2="62109" y2="32031"/>
+                        <a14:foregroundMark x1="62109" y1="32031" x2="73340" y2="29883"/>
+                        <a14:foregroundMark x1="73340" y1="29883" x2="73828" y2="65039"/>
+                        <a14:foregroundMark x1="25114" y1="59140" x2="27005" y2="70800"/>
+                        <a14:foregroundMark x1="31738" y1="59961" x2="40820" y2="54980"/>
+                        <a14:foregroundMark x1="40820" y1="54980" x2="55566" y2="59180"/>
+                        <a14:foregroundMark x1="55566" y1="59180" x2="62500" y2="55566"/>
+                        <a14:foregroundMark x1="62500" y1="55566" x2="68945" y2="58691"/>
+                        <a14:foregroundMark x1="68945" y1="58691" x2="68164" y2="43848"/>
+                        <a14:foregroundMark x1="68164" y1="43848" x2="70898" y2="37402"/>
+                        <a14:foregroundMark x1="70898" y1="37402" x2="65820" y2="32129"/>
+                        <a14:foregroundMark x1="65820" y1="32129" x2="51855" y2="28613"/>
+                        <a14:foregroundMark x1="51855" y1="28613" x2="41504" y2="27734"/>
+                        <a14:foregroundMark x1="41504" y1="27734" x2="32813" y2="30664"/>
+                        <a14:foregroundMark x1="32813" y1="30664" x2="37500" y2="45801"/>
+                        <a14:foregroundMark x1="37500" y1="45801" x2="46777" y2="42676"/>
+                        <a14:foregroundMark x1="46777" y1="42676" x2="45703" y2="49902"/>
+                        <a14:foregroundMark x1="45703" y1="49902" x2="38672" y2="47852"/>
+                        <a14:foregroundMark x1="38672" y1="47852" x2="45898" y2="41992"/>
+                        <a14:foregroundMark x1="45898" y1="41992" x2="56152" y2="42871"/>
+                        <a14:foregroundMark x1="56152" y1="42871" x2="59570" y2="48926"/>
+                        <a14:foregroundMark x1="59570" y1="48926" x2="47266" y2="51855"/>
+                        <a14:foregroundMark x1="47266" y1="51855" x2="47070" y2="44824"/>
+                        <a14:foregroundMark x1="47070" y1="44824" x2="57227" y2="44922"/>
+                        <a14:foregroundMark x1="57227" y1="44922" x2="63770" y2="50195"/>
+                        <a14:foregroundMark x1="63770" y1="50195" x2="51758" y2="54590"/>
+                        <a14:foregroundMark x1="51758" y1="54590" x2="42773" y2="52148"/>
+                        <a14:foregroundMark x1="42773" y1="52148" x2="49414" y2="45703"/>
+                        <a14:foregroundMark x1="49414" y1="45703" x2="58789" y2="46973"/>
+                        <a14:foregroundMark x1="58789" y1="46973" x2="62793" y2="54590"/>
+                        <a14:foregroundMark x1="62793" y1="54590" x2="45508" y2="60840"/>
+                        <a14:foregroundMark x1="45508" y1="60840" x2="49707" y2="55176"/>
+                        <a14:foregroundMark x1="49707" y1="55176" x2="56250" y2="57324"/>
+                        <a14:foregroundMark x1="56250" y1="57324" x2="51270" y2="62695"/>
+                        <a14:foregroundMark x1="51270" y1="62695" x2="46289" y2="57129"/>
+                        <a14:foregroundMark x1="46289" y1="57129" x2="53320" y2="56738"/>
+                        <a14:foregroundMark x1="53320" y1="56738" x2="53613" y2="58398"/>
+                        <a14:foregroundMark x1="48828" y1="40723" x2="42480" y2="36816"/>
+                        <a14:foregroundMark x1="42480" y1="36816" x2="49219" y2="37305"/>
+                        <a14:foregroundMark x1="49219" y1="37305" x2="41797" y2="36426"/>
+                        <a14:foregroundMark x1="41797" y1="36426" x2="47949" y2="31836"/>
+                        <a14:foregroundMark x1="47949" y1="31836" x2="55859" y2="34180"/>
+                        <a14:foregroundMark x1="55859" y1="34180" x2="49414" y2="39844"/>
+                        <a14:foregroundMark x1="49414" y1="39844" x2="46582" y2="32227"/>
+                        <a14:foregroundMark x1="46582" y1="32227" x2="54102" y2="29199"/>
+                        <a14:foregroundMark x1="54102" y1="29199" x2="61230" y2="31543"/>
+                        <a14:foregroundMark x1="61230" y1="31543" x2="53223" y2="37891"/>
+                        <a14:foregroundMark x1="53223" y1="37891" x2="45215" y2="35645"/>
+                        <a14:foregroundMark x1="45215" y1="35645" x2="52734" y2="31836"/>
+                        <a14:foregroundMark x1="52734" y1="31836" x2="52637" y2="39844"/>
+                        <a14:foregroundMark x1="52637" y1="39844" x2="42773" y2="41113"/>
+                        <a14:foregroundMark x1="42773" y1="41113" x2="40723" y2="32227"/>
+                        <a14:foregroundMark x1="40723" y1="32227" x2="49512" y2="29785"/>
+                        <a14:foregroundMark x1="49512" y1="29785" x2="57715" y2="33203"/>
+                        <a14:foregroundMark x1="57715" y1="33203" x2="53125" y2="39063"/>
+                        <a14:foregroundMark x1="53125" y1="39063" x2="43457" y2="36230"/>
+                        <a14:foregroundMark x1="43457" y1="36230" x2="48633" y2="30273"/>
+                        <a14:foregroundMark x1="48633" y1="30273" x2="55957" y2="34277"/>
+                        <a14:foregroundMark x1="55957" y1="34277" x2="52148" y2="40332"/>
+                        <a14:foregroundMark x1="52148" y1="40332" x2="45020" y2="39258"/>
+                        <a14:foregroundMark x1="45020" y1="39258" x2="50781" y2="33105"/>
+                        <a14:foregroundMark x1="50781" y1="33105" x2="55176" y2="38477"/>
+                        <a14:foregroundMark x1="55176" y1="38477" x2="47266" y2="43945"/>
+                        <a14:foregroundMark x1="47266" y1="43945" x2="51172" y2="36621"/>
+                        <a14:foregroundMark x1="51172" y1="36621" x2="53320" y2="40918"/>
+                        <a14:foregroundMark x1="60938" y1="45898" x2="55762" y2="38477"/>
+                        <a14:foregroundMark x1="55762" y1="38477" x2="62402" y2="35156"/>
+                        <a14:foregroundMark x1="62402" y1="35156" x2="68750" y2="41113"/>
+                        <a14:foregroundMark x1="68750" y1="41113" x2="67188" y2="48047"/>
+                        <a14:foregroundMark x1="67188" y1="48047" x2="60352" y2="47949"/>
+                        <a14:foregroundMark x1="60352" y1="47949" x2="56738" y2="41504"/>
+                        <a14:foregroundMark x1="56738" y1="41504" x2="56641" y2="40918"/>
+                        <a14:foregroundMark x1="40332" y1="73145" x2="47559" y2="68848"/>
+                        <a14:foregroundMark x1="47559" y1="68848" x2="56934" y2="68750"/>
+                        <a14:foregroundMark x1="56934" y1="68750" x2="49805" y2="73340"/>
+                        <a14:foregroundMark x1="49805" y1="73340" x2="37988" y2="73242"/>
+                        <a14:foregroundMark x1="72656" y1="70801" x2="72852" y2="71484"/>
+                        <a14:foregroundMark x1="72949" y1="70215" x2="73242" y2="70313"/>
+                        <a14:foregroundMark x1="73242" y1="69922" x2="73535" y2="69922"/>
+                        <a14:foregroundMark x1="73242" y1="69727" x2="73340" y2="69727"/>
+                        <a14:foregroundMark x1="73340" y1="71289" x2="73340" y2="71289"/>
+                        <a14:foregroundMark x1="73535" y1="70996" x2="73535" y2="70996"/>
+                        <a14:foregroundMark x1="73828" y1="70898" x2="73828" y2="70898"/>
+                        <a14:foregroundMark x1="44238" y1="25098" x2="44434" y2="25000"/>
+                        <a14:foregroundMark x1="44629" y1="24902" x2="44629" y2="24902"/>
+                        <a14:foregroundMark x1="45020" y1="24902" x2="45020" y2="24902"/>
+                        <a14:foregroundMark x1="45410" y1="25000" x2="45410" y2="25000"/>
+                        <a14:foregroundMark x1="45605" y1="25000" x2="45605" y2="25000"/>
+                        <a14:foregroundMark x1="46191" y1="24902" x2="46191" y2="24902"/>
+                        <a14:foregroundMark x1="46582" y1="24902" x2="46582" y2="24902"/>
+                        <a14:foregroundMark x1="46484" y1="24805" x2="46484" y2="24805"/>
+                        <a14:foregroundMark x1="46289" y1="24805" x2="45996" y2="24902"/>
+                        <a14:foregroundMark x1="45703" y1="24805" x2="45313" y2="24902"/>
+                        <a14:foregroundMark x1="45117" y1="24805" x2="45117" y2="24805"/>
+                        <a14:foregroundMark x1="44824" y1="24805" x2="43945" y2="24707"/>
+                        <a14:foregroundMark x1="44824" y1="24805" x2="44824" y2="24805"/>
+                        <a14:foregroundMark x1="44824" y1="24805" x2="44824" y2="24805"/>
+                        <a14:foregroundMark x1="45020" y1="24805" x2="45020" y2="24805"/>
+                        <a14:foregroundMark x1="45313" y1="24805" x2="45313" y2="24805"/>
+                        <a14:foregroundMark x1="45605" y1="24805" x2="45605" y2="24805"/>
+                        <a14:foregroundMark x1="45898" y1="24805" x2="45898" y2="24805"/>
+                        <a14:foregroundMark x1="45996" y1="24805" x2="45996" y2="24805"/>
+                        <a14:foregroundMark x1="46289" y1="24805" x2="46289" y2="24805"/>
+                        <a14:foregroundMark x1="46387" y1="24707" x2="46387" y2="24707"/>
+                        <a14:foregroundMark x1="46387" y1="24609" x2="46387" y2="24609"/>
+                        <a14:foregroundMark x1="46289" y1="24609" x2="46289" y2="24609"/>
+                        <a14:foregroundMark x1="46191" y1="24707" x2="46191" y2="24707"/>
+                        <a14:foregroundMark x1="45703" y1="24707" x2="45508" y2="24707"/>
+                        <a14:foregroundMark x1="45313" y1="24707" x2="45313" y2="24707"/>
+                        <a14:foregroundMark x1="45313" y1="24707" x2="45313" y2="24707"/>
+                        <a14:foregroundMark x1="45605" y1="24707" x2="45605" y2="24707"/>
+                        <a14:foregroundMark x1="45801" y1="24609" x2="45801" y2="24609"/>
+                        <a14:foregroundMark x1="45898" y1="24512" x2="45898" y2="24512"/>
+                        <a14:foregroundMark x1="46094" y1="24512" x2="46094" y2="24512"/>
+                        <a14:foregroundMark x1="46094" y1="24609" x2="46094" y2="24609"/>
+                        <a14:foregroundMark x1="46289" y1="24707" x2="46289" y2="24707"/>
+                        <a14:foregroundMark x1="46484" y1="24707" x2="46484" y2="24707"/>
+                        <a14:foregroundMark x1="46582" y1="24707" x2="46582" y2="24707"/>
+                        <a14:foregroundMark x1="46484" y1="24512" x2="46484" y2="24512"/>
+                        <a14:foregroundMark x1="46484" y1="24414" x2="46484" y2="24414"/>
+                        <a14:foregroundMark x1="46387" y1="24414" x2="46387" y2="24414"/>
+                        <a14:foregroundMark x1="46191" y1="24609" x2="46191" y2="24609"/>
+                        <a14:foregroundMark x1="46191" y1="24512" x2="46191" y2="24512"/>
+                        <a14:foregroundMark x1="46191" y1="24512" x2="46191" y2="24512"/>
+                        <a14:foregroundMark x1="46289" y1="24414" x2="46289" y2="24414"/>
+                        <a14:foregroundMark x1="46289" y1="24414" x2="46289" y2="24414"/>
+                        <a14:foregroundMark x1="26074" y1="70996" x2="26074" y2="70996"/>
+                        <a14:foregroundMark x1="26074" y1="70996" x2="26074" y2="70996"/>
+                        <a14:foregroundMark x1="26074" y1="70605" x2="26074" y2="70605"/>
+                        <a14:backgroundMark x1="14648" y1="28906" x2="15332" y2="29492"/>
+                        <a14:backgroundMark x1="15527" y1="28809" x2="15527" y2="28809"/>
+                        <a14:backgroundMark x1="46094" y1="24219" x2="60059" y2="23730"/>
+                        <a14:backgroundMark x1="60059" y1="23730" x2="53027" y2="23535"/>
+                        <a14:backgroundMark x1="53027" y1="23535" x2="55078" y2="23828"/>
+                        <a14:backgroundMark x1="59961" y1="24121" x2="60742" y2="24121"/>
+                        <a14:backgroundMark x1="24121" y1="35156" x2="24512" y2="33594"/>
+                        <a14:backgroundMark x1="24414" y1="34863" x2="24414" y2="34863"/>
+                        <a14:backgroundMark x1="24316" y1="34766" x2="24316" y2="34766"/>
+                        <a14:backgroundMark x1="24316" y1="34766" x2="24316" y2="34766"/>
+                        <a14:backgroundMark x1="24316" y1="34766" x2="24316" y2="34766"/>
+                        <a14:backgroundMark x1="24414" y1="34863" x2="24609" y2="34961"/>
+                        <a14:backgroundMark x1="24609" y1="34570" x2="24609" y2="34570"/>
+                        <a14:backgroundMark x1="24609" y1="34277" x2="24609" y2="34277"/>
+                        <a14:backgroundMark x1="24609" y1="34277" x2="24609" y2="34277"/>
+                        <a14:backgroundMark x1="24609" y1="34473" x2="24609" y2="34473"/>
+                        <a14:backgroundMark x1="24707" y1="34570" x2="24707" y2="34570"/>
+                        <a14:backgroundMark x1="24707" y1="34766" x2="24707" y2="34766"/>
+                        <a14:backgroundMark x1="24805" y1="34473" x2="24805" y2="34473"/>
+                        <a14:backgroundMark x1="24805" y1="34277" x2="24805" y2="34277"/>
+                        <a14:backgroundMark x1="24707" y1="34082" x2="24707" y2="34082"/>
+                        <a14:backgroundMark x1="24707" y1="33984" x2="24707" y2="33984"/>
+                        <a14:backgroundMark x1="24707" y1="33984" x2="24707" y2="33984"/>
+                        <a14:backgroundMark x1="24707" y1="33984" x2="24707" y2="33984"/>
+                        <a14:backgroundMark x1="24707" y1="33789" x2="24707" y2="33789"/>
+                        <a14:backgroundMark x1="24609" y1="33789" x2="24609" y2="33789"/>
+                        <a14:backgroundMark x1="24609" y1="33691" x2="24609" y2="33887"/>
+                        <a14:backgroundMark x1="24609" y1="33984" x2="24609" y2="33984"/>
+                        <a14:backgroundMark x1="24707" y1="33984" x2="24707" y2="33984"/>
+                        <a14:backgroundMark x1="24121" y1="53906" x2="24121" y2="53906"/>
+                        <a14:backgroundMark x1="24121" y1="53906" x2="24121" y2="53906"/>
+                        <a14:backgroundMark x1="24121" y1="53906" x2="24121" y2="53906"/>
+                        <a14:backgroundMark x1="24121" y1="53906" x2="24121" y2="53906"/>
+                        <a14:backgroundMark x1="24121" y1="53906" x2="24121" y2="53906"/>
+                        <a14:backgroundMark x1="24219" y1="53906" x2="24219" y2="53906"/>
+                        <a14:backgroundMark x1="24316" y1="53906" x2="24316" y2="53906"/>
+                        <a14:backgroundMark x1="24316" y1="53711" x2="24316" y2="53711"/>
+                        <a14:backgroundMark x1="24316" y1="53516" x2="24316" y2="53516"/>
+                        <a14:backgroundMark x1="24219" y1="53711" x2="24316" y2="53906"/>
+                        <a14:backgroundMark x1="24316" y1="53809" x2="24316" y2="54004"/>
+                        <a14:backgroundMark x1="24316" y1="54004" x2="24316" y2="54199"/>
+                        <a14:backgroundMark x1="24316" y1="54199" x2="24316" y2="54395"/>
+                        <a14:backgroundMark x1="24316" y1="54395" x2="24316" y2="54395"/>
+                        <a14:backgroundMark x1="24316" y1="54492" x2="24316" y2="54492"/>
+                        <a14:backgroundMark x1="24316" y1="54688" x2="24316" y2="54688"/>
+                        <a14:backgroundMark x1="24316" y1="54785" x2="24316" y2="54785"/>
+                        <a14:backgroundMark x1="24219" y1="54883" x2="24219" y2="54883"/>
+                        <a14:backgroundMark x1="24219" y1="54980" x2="24219" y2="54980"/>
+                        <a14:backgroundMark x1="24219" y1="55176" x2="24219" y2="55176"/>
+                        <a14:backgroundMark x1="24219" y1="55176" x2="24219" y2="55176"/>
+                        <a14:backgroundMark x1="24219" y1="55273" x2="24219" y2="55273"/>
+                        <a14:backgroundMark x1="24219" y1="55371" x2="24219" y2="55371"/>
+                        <a14:backgroundMark x1="24219" y1="55566" x2="24219" y2="55566"/>
+                        <a14:backgroundMark x1="24316" y1="55664" x2="24316" y2="55664"/>
+                        <a14:backgroundMark x1="24219" y1="55762" x2="24219" y2="55957"/>
+                        <a14:backgroundMark x1="24219" y1="55957" x2="24219" y2="56152"/>
+                        <a14:backgroundMark x1="24219" y1="56152" x2="24219" y2="56152"/>
+                        <a14:backgroundMark x1="24316" y1="56152" x2="24316" y2="56152"/>
+                        <a14:backgroundMark x1="24414" y1="56152" x2="24414" y2="56152"/>
+                        <a14:backgroundMark x1="24512" y1="56152" x2="24512" y2="56152"/>
+                        <a14:backgroundMark x1="24512" y1="56152" x2="24512" y2="56152"/>
+                        <a14:backgroundMark x1="24512" y1="55859" x2="24512" y2="55859"/>
+                        <a14:backgroundMark x1="24512" y1="55762" x2="24512" y2="55762"/>
+                        <a14:backgroundMark x1="24414" y1="55664" x2="24414" y2="55664"/>
+                        <a14:backgroundMark x1="24414" y1="55566" x2="24414" y2="55566"/>
+                        <a14:backgroundMark x1="24414" y1="55469" x2="24414" y2="55469"/>
+                        <a14:backgroundMark x1="24512" y1="55371" x2="24512" y2="55371"/>
+                        <a14:backgroundMark x1="24512" y1="55176" x2="24512" y2="55176"/>
+                        <a14:backgroundMark x1="24512" y1="54883" x2="24512" y2="54883"/>
+                        <a14:backgroundMark x1="24414" y1="54688" x2="24414" y2="54688"/>
+                        <a14:backgroundMark x1="24414" y1="54688" x2="24414" y2="54688"/>
+                        <a14:backgroundMark x1="24414" y1="54590" x2="24414" y2="54590"/>
+                        <a14:backgroundMark x1="24414" y1="54395" x2="24414" y2="54395"/>
+                        <a14:backgroundMark x1="24414" y1="54395" x2="24414" y2="54395"/>
+                        <a14:backgroundMark x1="24414" y1="54199" x2="24414" y2="54199"/>
+                        <a14:backgroundMark x1="24414" y1="54102" x2="24414" y2="54102"/>
+                        <a14:backgroundMark x1="24316" y1="54004" x2="24316" y2="54297"/>
+                        <a14:backgroundMark x1="24316" y1="54688" x2="24414" y2="55078"/>
+                        <a14:backgroundMark x1="24414" y1="55176" x2="24414" y2="55176"/>
+                        <a14:backgroundMark x1="24414" y1="55566" x2="24414" y2="55566"/>
+                        <a14:backgroundMark x1="24414" y1="55762" x2="24414" y2="55762"/>
+                        <a14:backgroundMark x1="24512" y1="55859" x2="24512" y2="55859"/>
+                        <a14:backgroundMark x1="24609" y1="56152" x2="24609" y2="56152"/>
+                        <a14:backgroundMark x1="24609" y1="56250" x2="24609" y2="56445"/>
+                        <a14:backgroundMark x1="24609" y1="56445" x2="24609" y2="56445"/>
+                        <a14:backgroundMark x1="24609" y1="56641" x2="24609" y2="56836"/>
+                        <a14:backgroundMark x1="24512" y1="56836" x2="24512" y2="56836"/>
+                        <a14:backgroundMark x1="24512" y1="56934" x2="24512" y2="56934"/>
+                        <a14:backgroundMark x1="24512" y1="57129" x2="24512" y2="57324"/>
+                        <a14:backgroundMark x1="24512" y1="57324" x2="24512" y2="57520"/>
+                        <a14:backgroundMark x1="24512" y1="57520" x2="24512" y2="57520"/>
+                        <a14:backgroundMark x1="24512" y1="57813" x2="24512" y2="58008"/>
+                        <a14:backgroundMark x1="24512" y1="57910" x2="24512" y2="58203"/>
+                        <a14:backgroundMark x1="24609" y1="58105" x2="24609" y2="58105"/>
+                        <a14:backgroundMark x1="24609" y1="58105" x2="24609" y2="58105"/>
+                        <a14:backgroundMark x1="24609" y1="57910" x2="24609" y2="57910"/>
+                        <a14:backgroundMark x1="24609" y1="57715" x2="24609" y2="57715"/>
+                        <a14:backgroundMark x1="24609" y1="57617" x2="24609" y2="57617"/>
+                        <a14:backgroundMark x1="24609" y1="57422" x2="24609" y2="57422"/>
+                        <a14:backgroundMark x1="24609" y1="57324" x2="24609" y2="57324"/>
+                        <a14:backgroundMark x1="24609" y1="57129" x2="24609" y2="57129"/>
+                        <a14:backgroundMark x1="24609" y1="57129" x2="24609" y2="57129"/>
+                        <a14:backgroundMark x1="24609" y1="56934" x2="24609" y2="56934"/>
+                        <a14:backgroundMark x1="24609" y1="56738" x2="24609" y2="56738"/>
+                        <a14:backgroundMark x1="24512" y1="56543" x2="24512" y2="56543"/>
+                        <a14:backgroundMark x1="24512" y1="56445" x2="24512" y2="56445"/>
+                        <a14:backgroundMark x1="24512" y1="56348" x2="24512" y2="56348"/>
+                        <a14:backgroundMark x1="24512" y1="56250" x2="24512" y2="56250"/>
+                        <a14:backgroundMark x1="24414" y1="58301" x2="24414" y2="58301"/>
+                        <a14:backgroundMark x1="24414" y1="58301" x2="24414" y2="58301"/>
+                        <a14:backgroundMark x1="24414" y1="58594" x2="24414" y2="58594"/>
+                        <a14:backgroundMark x1="45801" y1="24121" x2="45801" y2="24316"/>
+                        <a14:backgroundMark x1="46094" y1="24023" x2="46094" y2="24023"/>
+                        <a14:backgroundMark x1="46289" y1="23828" x2="46289" y2="23828"/>
+                        <a14:backgroundMark x1="46289" y1="23926" x2="46289" y2="23926"/>
+                        <a14:backgroundMark x1="46484" y1="23926" x2="46484" y2="23926"/>
+                        <a14:backgroundMark x1="46484" y1="23926" x2="46484" y2="23926"/>
+                        <a14:backgroundMark x1="45801" y1="23926" x2="45801" y2="23926"/>
+                        <a14:backgroundMark x1="45605" y1="23926" x2="45605" y2="23926"/>
+                        <a14:backgroundMark x1="45313" y1="24023" x2="45313" y2="24023"/>
+                        <a14:backgroundMark x1="45020" y1="24023" x2="45020" y2="24023"/>
+                        <a14:backgroundMark x1="44824" y1="24023" x2="44824" y2="24023"/>
+                        <a14:backgroundMark x1="44727" y1="24023" x2="44727" y2="24023"/>
+                        <a14:backgroundMark x1="44727" y1="24023" x2="44727" y2="24219"/>
+                        <a14:backgroundMark x1="44727" y1="24219" x2="44727" y2="24219"/>
+                        <a14:backgroundMark x1="44727" y1="23926" x2="44727" y2="23926"/>
+                        <a14:backgroundMark x1="44531" y1="24023" x2="44531" y2="24023"/>
+                        <a14:backgroundMark x1="44336" y1="24023" x2="44336" y2="24023"/>
+                        <a14:backgroundMark x1="44336" y1="24121" x2="44336" y2="24121"/>
+                        <a14:backgroundMark x1="44336" y1="24121" x2="44336" y2="24121"/>
+                        <a14:backgroundMark x1="44238" y1="24219" x2="44238" y2="24219"/>
+                        <a14:backgroundMark x1="44141" y1="24316" x2="44141" y2="24316"/>
+                        <a14:backgroundMark x1="44434" y1="24121" x2="44434" y2="24121"/>
+                        <a14:backgroundMark x1="44434" y1="24219" x2="44434" y2="24219"/>
+                        <a14:backgroundMark x1="44434" y1="24316" x2="44434" y2="24316"/>
+                        <a14:backgroundMark x1="44824" y1="24023" x2="44824" y2="24023"/>
+                        <a14:backgroundMark x1="44824" y1="24023" x2="44824" y2="24023"/>
+                        <a14:backgroundMark x1="44824" y1="24023" x2="44824" y2="24023"/>
+                        <a14:backgroundMark x1="44824" y1="24219" x2="44824" y2="24219"/>
+                        <a14:backgroundMark x1="44824" y1="24316" x2="44824" y2="24316"/>
+                        <a14:backgroundMark x1="44824" y1="24414" x2="44824" y2="24414"/>
+                        <a14:backgroundMark x1="44824" y1="24414" x2="44824" y2="24414"/>
+                        <a14:backgroundMark x1="44824" y1="24414" x2="44824" y2="24414"/>
+                        <a14:backgroundMark x1="45117" y1="24219" x2="45117" y2="24219"/>
+                        <a14:backgroundMark x1="45117" y1="24219" x2="45117" y2="24219"/>
+                        <a14:backgroundMark x1="45117" y1="24219" x2="45117" y2="24219"/>
+                        <a14:backgroundMark x1="45117" y1="24316" x2="45117" y2="24316"/>
+                        <a14:backgroundMark x1="45117" y1="24219" x2="45117" y2="24219"/>
+                        <a14:backgroundMark x1="45313" y1="24219" x2="45313" y2="24219"/>
+                        <a14:backgroundMark x1="45313" y1="24219" x2="45313" y2="24219"/>
+                        <a14:backgroundMark x1="60645" y1="24219" x2="60645" y2="24219"/>
+                        <a14:backgroundMark x1="60645" y1="24219" x2="60645" y2="24219"/>
+                        <a14:backgroundMark x1="60547" y1="24316" x2="60547" y2="24316"/>
+                        <a14:backgroundMark x1="61035" y1="24219" x2="61035" y2="24219"/>
+                        <a14:backgroundMark x1="61035" y1="24219" x2="61035" y2="24219"/>
+                        <a14:backgroundMark x1="60938" y1="24219" x2="60938" y2="24219"/>
+                        <a14:backgroundMark x1="61328" y1="24023" x2="61328" y2="24023"/>
+                        <a14:backgroundMark x1="61328" y1="24023" x2="61328" y2="24023"/>
+                        <a14:backgroundMark x1="61328" y1="24219" x2="61328" y2="24219"/>
+                        <a14:backgroundMark x1="61328" y1="24219" x2="61328" y2="24219"/>
+                        <a14:backgroundMark x1="41699" y1="24512" x2="41699" y2="24512"/>
+                        <a14:backgroundMark x1="41797" y1="24512" x2="41797" y2="24512"/>
+                        <a14:backgroundMark x1="41992" y1="24512" x2="41992" y2="24512"/>
+                        <a14:backgroundMark x1="42480" y1="24512" x2="42480" y2="24512"/>
+                        <a14:backgroundMark x1="42969" y1="24316" x2="42969" y2="24316"/>
+                        <a14:backgroundMark x1="42871" y1="24219" x2="42871" y2="24219"/>
+                        <a14:backgroundMark x1="42969" y1="24414" x2="42969" y2="24414"/>
+                        <a14:backgroundMark x1="43164" y1="24414" x2="43164" y2="24414"/>
+                        <a14:backgroundMark x1="43848" y1="24316" x2="43848" y2="24316"/>
+                        <a14:backgroundMark x1="43848" y1="24316" x2="43848" y2="24316"/>
+                        <a14:backgroundMark x1="43848" y1="24316" x2="43848" y2="24316"/>
+                        <a14:backgroundMark x1="43652" y1="24414" x2="43652" y2="24414"/>
+                        <a14:backgroundMark x1="43359" y1="24414" x2="43164" y2="24512"/>
+                        <a14:backgroundMark x1="42969" y1="24414" x2="42969" y2="24414"/>
+                        <a14:backgroundMark x1="42676" y1="24316" x2="42480" y2="24316"/>
+                        <a14:backgroundMark x1="42383" y1="24219" x2="42383" y2="24219"/>
+                        <a14:backgroundMark x1="42090" y1="24219" x2="42090" y2="24219"/>
+                        <a14:backgroundMark x1="41309" y1="24219" x2="41309" y2="24219"/>
+                        <a14:backgroundMark x1="41309" y1="24219" x2="41309" y2="24219"/>
+                        <a14:backgroundMark x1="41309" y1="24219" x2="41309" y2="24219"/>
+                        <a14:backgroundMark x1="41504" y1="24512" x2="41504" y2="24512"/>
+                        <a14:backgroundMark x1="41602" y1="24512" x2="41602" y2="24512"/>
+                        <a14:backgroundMark x1="41504" y1="24512" x2="41504" y2="24512"/>
+                        <a14:backgroundMark x1="41797" y1="24023" x2="41797" y2="24023"/>
+                        <a14:backgroundMark x1="41797" y1="24512" x2="41797" y2="24512"/>
+                        <a14:backgroundMark x1="41504" y1="24707" x2="41504" y2="24707"/>
+                        <a14:backgroundMark x1="41504" y1="24512" x2="41699" y2="24902"/>
+                        <a14:backgroundMark x1="24414" y1="58105" x2="24707" y2="58105"/>
+                        <a14:backgroundMark x1="24512" y1="58594" x2="24512" y2="58594"/>
+                        <a14:backgroundMark x1="24219" y1="57617" x2="24023" y2="57422"/>
+                        <a14:backgroundMark x1="23633" y1="57129" x2="24023" y2="58301"/>
+                        <a14:backgroundMark x1="24219" y1="57910" x2="24121" y2="58105"/>
+                        <a14:backgroundMark x1="24805" y1="58789" x2="24902" y2="58398"/>
+                        <a14:backgroundMark x1="24902" y1="58203" x2="25586" y2="58691"/>
+                        <a14:backgroundMark x1="25586" y1="57910" x2="25488" y2="58301"/>
+                        <a14:backgroundMark x1="25391" y1="57813" x2="25098" y2="58398"/>
+                        <a14:backgroundMark x1="25098" y1="70703" x2="25098" y2="70703"/>
+                        <a14:backgroundMark x1="25293" y1="70996" x2="25293" y2="70996"/>
+                        <a14:backgroundMark x1="25293" y1="70996" x2="25293" y2="70996"/>
+                        <a14:backgroundMark x1="25488" y1="71289" x2="25586" y2="71582"/>
+                        <a14:backgroundMark x1="25586" y1="71582" x2="25586" y2="71582"/>
+                        <a14:backgroundMark x1="25586" y1="71387" x2="25586" y2="71387"/>
+                        <a14:backgroundMark x1="25098" y1="70996" x2="25098" y2="70996"/>
+                        <a14:backgroundMark x1="25195" y1="70996" x2="25195" y2="70996"/>
+                        <a14:backgroundMark x1="25684" y1="71289" x2="25684" y2="71289"/>
+                        <a14:backgroundMark x1="25586" y1="71191" x2="25391" y2="71191"/>
+                        <a14:backgroundMark x1="25195" y1="70801" x2="25195" y2="70801"/>
+                        <a14:backgroundMark x1="25195" y1="70801" x2="25195" y2="70801"/>
+                        <a14:backgroundMark x1="25586" y1="71191" x2="25586" y2="71191"/>
+                        <a14:backgroundMark x1="25391" y1="70703" x2="25391" y2="70703"/>
+                        <a14:backgroundMark x1="25586" y1="70996" x2="25586" y2="70996"/>
+                        <a14:backgroundMark x1="25684" y1="71191" x2="25684" y2="71191"/>
+                        <a14:backgroundMark x1="25781" y1="71191" x2="25781" y2="71191"/>
+                        <a14:backgroundMark x1="25879" y1="71094" x2="25879" y2="71094"/>
+                        <a14:backgroundMark x1="25879" y1="70996" x2="25879" y2="70996"/>
+                        <a14:backgroundMark x1="25879" y1="70801" x2="25879" y2="70801"/>
+                        <a14:backgroundMark x1="25781" y1="70703" x2="25781" y2="70703"/>
+                        <a14:backgroundMark x1="25586" y1="70508" x2="25586" y2="70508"/>
+                        <a14:backgroundMark x1="25586" y1="70508" x2="25586" y2="70508"/>
+                        <a14:backgroundMark x1="25684" y1="70508" x2="25684" y2="70508"/>
+                        <a14:backgroundMark x1="25879" y1="70605" x2="25879" y2="70605"/>
+                        <a14:backgroundMark x1="25879" y1="70703" x2="25879" y2="70703"/>
+                        <a14:backgroundMark x1="26074" y1="70996" x2="26074" y2="70996"/>
+                        <a14:backgroundMark x1="26074" y1="70996" x2="26074" y2="70996"/>
+                        <a14:backgroundMark x1="26074" y1="71289" x2="26074" y2="71289"/>
+                      </a14:backgroundRemoval>
+                    </a14:imgEffect>
+                  </a14:imgLayer>
+                </a14:imgProps>
+              </a:ext>
+            </a:extLst>
+          </a:blip>
+          <a:srcRect l="23814" t="23063" r="23754" b="22523"/>
+          <a:stretch/>
+        </p:blipFill>
+        <p:spPr>
+          <a:xfrm>
+            <a:off x="3895800" y="1039565"/>
+            <a:ext cx="3659583" cy="3797916"/>
+          </a:xfrm>
+          <a:prstGeom prst="rect">
+            <a:avLst/>
+          </a:prstGeom>
+        </p:spPr>
+      </p:pic>
+      <p:sp>
+        <p:nvSpPr>
+          <p:cNvPr id="6" name="TextBox 5">
+            <a:extLst>
+              <a:ext uri="{FF2B5EF4-FFF2-40B4-BE49-F238E27FC236}">
+                <a16:creationId xmlns:a16="http://schemas.microsoft.com/office/drawing/2014/main" id="{8A605B8A-8FCF-CF26-F2A0-0165EB3ABA1E}"/>
+              </a:ext>
+            </a:extLst>
+          </p:cNvPr>
+          <p:cNvSpPr txBox="1"/>
+          <p:nvPr/>
+        </p:nvSpPr>
+        <p:spPr>
+          <a:xfrm>
+            <a:off x="3360310" y="4710439"/>
+            <a:ext cx="5149379" cy="1107996"/>
+          </a:xfrm>
+          <a:prstGeom prst="rect">
+            <a:avLst/>
+          </a:prstGeom>
+          <a:noFill/>
+        </p:spPr>
+        <p:txBody>
+          <a:bodyPr wrap="square" rtlCol="0">
+            <a:spAutoFit/>
+          </a:bodyPr>
+          <a:lstStyle/>
+          <a:p>
+            <a:r>
+              <a:rPr lang="en-AU" sz="6600" b="1" i="0" u="none" strike="noStrike" dirty="0">
+                <a:solidFill>
+                  <a:srgbClr val="FFFFFF"/>
+                </a:solidFill>
+                <a:effectLst/>
+                <a:latin typeface="Comfortaa variant0"/>
+              </a:rPr>
+              <a:t>GammaBayes</a:t>
+            </a:r>
+            <a:endParaRPr lang="en-AU" sz="6600" b="1" dirty="0">
+              <a:latin typeface="Aharoni" panose="02010803020104030203" pitchFamily="2" charset="-79"/>
+              <a:cs typeface="Aharoni" panose="02010803020104030203" pitchFamily="2" charset="-79"/>
+            </a:endParaRPr>
+          </a:p>
+        </p:txBody>
+      </p:sp>
+      <p:sp>
+        <p:nvSpPr>
+          <p:cNvPr id="8" name="TextBox 7">
+            <a:extLst>
+              <a:ext uri="{FF2B5EF4-FFF2-40B4-BE49-F238E27FC236}">
+                <a16:creationId xmlns:a16="http://schemas.microsoft.com/office/drawing/2014/main" id="{CF224A28-602E-36B7-5D48-60D9F346D186}"/>
+              </a:ext>
+            </a:extLst>
+          </p:cNvPr>
+          <p:cNvSpPr txBox="1"/>
+          <p:nvPr/>
+        </p:nvSpPr>
+        <p:spPr>
+          <a:xfrm>
+            <a:off x="1087394" y="6289589"/>
+            <a:ext cx="2594919" cy="369332"/>
+          </a:xfrm>
+          <a:prstGeom prst="rect">
+            <a:avLst/>
+          </a:prstGeom>
+          <a:noFill/>
+        </p:spPr>
+        <p:txBody>
+          <a:bodyPr wrap="square" rtlCol="0">
+            <a:spAutoFit/>
+          </a:bodyPr>
+          <a:lstStyle/>
+          <a:p>
+            <a:r>
+              <a:rPr lang="en-AU" b="0" i="0" u="none" strike="noStrike" dirty="0" err="1">
+                <a:solidFill>
+                  <a:srgbClr val="021031"/>
+                </a:solidFill>
+                <a:effectLst/>
+                <a:latin typeface="Google Sans"/>
+              </a:rPr>
+              <a:t>Comfortaa</a:t>
+            </a:r>
+            <a:r>
+              <a:rPr lang="en-AU" b="0" i="0" u="none" strike="noStrike" dirty="0">
+                <a:solidFill>
+                  <a:srgbClr val="021031"/>
+                </a:solidFill>
+                <a:effectLst/>
+                <a:latin typeface="Google Sans"/>
+              </a:rPr>
+              <a:t>, Bold 700</a:t>
+            </a:r>
+          </a:p>
+        </p:txBody>
+      </p:sp>
+    </p:spTree>
+    <p:extLst>
+      <p:ext uri="{BB962C8B-B14F-4D97-AF65-F5344CB8AC3E}">
+        <p14:creationId xmlns:p14="http://schemas.microsoft.com/office/powerpoint/2010/main" val="2509217405"/>
+      </p:ext>
+    </p:extLst>
+  </p:cSld>
+  <p:clrMapOvr>
+    <a:masterClrMapping/>
+  </p:clrMapOvr>
+</p:sld>
+</file>
+
+<file path=ppt/slides/slide3.xml><?xml version="1.0" encoding="utf-8"?>
 <p:sld xmlns:a="http://schemas.openxmlformats.org/drawingml/2006/main" xmlns:r="http://schemas.openxmlformats.org/officeDocument/2006/relationships" xmlns:p="http://schemas.openxmlformats.org/presentationml/2006/main">
   <p:cSld>
     <p:bg>
@@ -3536,8 +4096,8 @@
         </p:blipFill>
         <p:spPr>
           <a:xfrm>
-            <a:off x="4014672" y="1039565"/>
-            <a:ext cx="3659583" cy="3797916"/>
+            <a:off x="1005255" y="1132164"/>
+            <a:ext cx="2355380" cy="2444414"/>
           </a:xfrm>
           <a:prstGeom prst="rect">
             <a:avLst/>
@@ -3558,8 +4118,8 @@
         </p:nvSpPr>
         <p:spPr>
           <a:xfrm>
-            <a:off x="3360310" y="4710439"/>
-            <a:ext cx="5149379" cy="1107996"/>
+            <a:off x="3360635" y="1714530"/>
+            <a:ext cx="8470063" cy="1862048"/>
           </a:xfrm>
           <a:prstGeom prst="rect">
             <a:avLst/>
@@ -3573,16 +4133,19 @@
           <a:lstStyle/>
           <a:p>
             <a:r>
-              <a:rPr lang="en-AU" sz="6600" b="1" i="0" u="none" strike="noStrike" dirty="0">
+              <a:rPr lang="en-AU" sz="11500" b="1" i="0" u="none" strike="noStrike" dirty="0">
                 <a:solidFill>
-                  <a:srgbClr val="FFFFFF"/>
+                  <a:srgbClr val="0B293A"/>
                 </a:solidFill>
                 <a:effectLst/>
                 <a:latin typeface="Comfortaa variant0"/>
               </a:rPr>
               <a:t>GammaBayes</a:t>
             </a:r>
-            <a:endParaRPr lang="en-AU" sz="6600" b="1" dirty="0">
+            <a:endParaRPr lang="en-AU" sz="11500" b="1" dirty="0">
+              <a:solidFill>
+                <a:srgbClr val="0B293A"/>
+              </a:solidFill>
               <a:latin typeface="Aharoni" panose="02010803020104030203" pitchFamily="2" charset="-79"/>
               <a:cs typeface="Aharoni" panose="02010803020104030203" pitchFamily="2" charset="-79"/>
             </a:endParaRPr>
@@ -3642,10 +4205,10 @@
       </p:sp>
       <p:sp>
         <p:nvSpPr>
-          <p:cNvPr id="4" name="Rectangle 3">
-            <a:extLst>
-              <a:ext uri="{FF2B5EF4-FFF2-40B4-BE49-F238E27FC236}">
-                <a16:creationId xmlns:a16="http://schemas.microsoft.com/office/drawing/2014/main" id="{1102638D-74A3-D461-86EF-EC73CE03B7AE}"/>
+          <p:cNvPr id="2" name="Rectangle 1">
+            <a:extLst>
+              <a:ext uri="{FF2B5EF4-FFF2-40B4-BE49-F238E27FC236}">
+                <a16:creationId xmlns:a16="http://schemas.microsoft.com/office/drawing/2014/main" id="{19537807-4C44-8BBE-A5E7-E28C29560996}"/>
               </a:ext>
             </a:extLst>
           </p:cNvPr>
@@ -3654,18 +4217,18 @@
         </p:nvSpPr>
         <p:spPr>
           <a:xfrm>
-            <a:off x="-106018" y="4282880"/>
-            <a:ext cx="12404035" cy="308643"/>
+            <a:off x="3301139" y="902750"/>
+            <a:ext cx="108831" cy="3319493"/>
           </a:xfrm>
           <a:prstGeom prst="rect">
             <a:avLst/>
           </a:prstGeom>
           <a:solidFill>
-            <a:srgbClr val="B0C6D5"/>
+            <a:srgbClr val="FFFFFF"/>
           </a:solidFill>
           <a:ln>
             <a:solidFill>
-              <a:srgbClr val="B0C6D5"/>
+              <a:srgbClr val="FFFFFF"/>
             </a:solidFill>
           </a:ln>
         </p:spPr>
@@ -3696,10 +4259,10 @@
       </p:sp>
       <p:sp>
         <p:nvSpPr>
-          <p:cNvPr id="2" name="Rectangle 1">
-            <a:extLst>
-              <a:ext uri="{FF2B5EF4-FFF2-40B4-BE49-F238E27FC236}">
-                <a16:creationId xmlns:a16="http://schemas.microsoft.com/office/drawing/2014/main" id="{7B55DEA1-4002-F8FA-949D-669C3E31D545}"/>
+          <p:cNvPr id="3" name="Rectangle 2">
+            <a:extLst>
+              <a:ext uri="{FF2B5EF4-FFF2-40B4-BE49-F238E27FC236}">
+                <a16:creationId xmlns:a16="http://schemas.microsoft.com/office/drawing/2014/main" id="{832205D4-7D85-16E4-27CB-7AC25BD242AD}"/>
               </a:ext>
             </a:extLst>
           </p:cNvPr>
@@ -3708,18 +4271,18 @@
         </p:nvSpPr>
         <p:spPr>
           <a:xfrm>
-            <a:off x="0" y="4472609"/>
-            <a:ext cx="12192000" cy="2385391"/>
+            <a:off x="847256" y="694624"/>
+            <a:ext cx="206052" cy="3319493"/>
           </a:xfrm>
           <a:prstGeom prst="rect">
             <a:avLst/>
           </a:prstGeom>
           <a:solidFill>
-            <a:srgbClr val="0B293A"/>
+            <a:srgbClr val="FFFFFF"/>
           </a:solidFill>
           <a:ln>
             <a:solidFill>
-              <a:srgbClr val="0B293A"/>
+              <a:srgbClr val="FFFFFF"/>
             </a:solidFill>
           </a:ln>
         </p:spPr>
@@ -3750,10 +4313,10 @@
       </p:sp>
       <p:sp>
         <p:nvSpPr>
-          <p:cNvPr id="7" name="Rectangle 6">
-            <a:extLst>
-              <a:ext uri="{FF2B5EF4-FFF2-40B4-BE49-F238E27FC236}">
-                <a16:creationId xmlns:a16="http://schemas.microsoft.com/office/drawing/2014/main" id="{2F660689-CEBC-9EB4-F822-29FCC21FFB0B}"/>
+          <p:cNvPr id="4" name="Rectangle 3">
+            <a:extLst>
+              <a:ext uri="{FF2B5EF4-FFF2-40B4-BE49-F238E27FC236}">
+                <a16:creationId xmlns:a16="http://schemas.microsoft.com/office/drawing/2014/main" id="{43E5B4B0-B4F3-4FA4-763F-91F954E18C3D}"/>
               </a:ext>
             </a:extLst>
           </p:cNvPr>
@@ -3762,8 +4325,8 @@
         </p:nvSpPr>
         <p:spPr>
           <a:xfrm>
-            <a:off x="3802637" y="775429"/>
-            <a:ext cx="293113" cy="3319493"/>
+            <a:off x="999655" y="847025"/>
+            <a:ext cx="498514" cy="754468"/>
           </a:xfrm>
           <a:prstGeom prst="rect">
             <a:avLst/>
@@ -3804,10 +4367,10 @@
       </p:sp>
       <p:sp>
         <p:nvSpPr>
-          <p:cNvPr id="9" name="Rectangle 8">
-            <a:extLst>
-              <a:ext uri="{FF2B5EF4-FFF2-40B4-BE49-F238E27FC236}">
-                <a16:creationId xmlns:a16="http://schemas.microsoft.com/office/drawing/2014/main" id="{20C27147-9955-42A9-DB93-A4DDADCA03C1}"/>
+          <p:cNvPr id="7" name="Rectangle 6">
+            <a:extLst>
+              <a:ext uri="{FF2B5EF4-FFF2-40B4-BE49-F238E27FC236}">
+                <a16:creationId xmlns:a16="http://schemas.microsoft.com/office/drawing/2014/main" id="{C6ECF3B4-9461-69CB-E9CB-E2F5B2A2D090}"/>
               </a:ext>
             </a:extLst>
           </p:cNvPr>
@@ -3816,8 +4379,8 @@
         </p:nvSpPr>
         <p:spPr>
           <a:xfrm>
-            <a:off x="7580708" y="963387"/>
-            <a:ext cx="293113" cy="3319493"/>
+            <a:off x="3014376" y="847025"/>
+            <a:ext cx="498514" cy="754468"/>
           </a:xfrm>
           <a:prstGeom prst="rect">
             <a:avLst/>
@@ -3858,10 +4421,10 @@
       </p:sp>
       <p:sp>
         <p:nvSpPr>
-          <p:cNvPr id="3" name="Rectangle 2">
-            <a:extLst>
-              <a:ext uri="{FF2B5EF4-FFF2-40B4-BE49-F238E27FC236}">
-                <a16:creationId xmlns:a16="http://schemas.microsoft.com/office/drawing/2014/main" id="{804E0E71-722E-7F13-1E09-E64BD63E64B9}"/>
+          <p:cNvPr id="9" name="Rectangle 8">
+            <a:extLst>
+              <a:ext uri="{FF2B5EF4-FFF2-40B4-BE49-F238E27FC236}">
+                <a16:creationId xmlns:a16="http://schemas.microsoft.com/office/drawing/2014/main" id="{000E23C5-36FD-B322-215A-9A0415C53036}"/>
               </a:ext>
             </a:extLst>
           </p:cNvPr>
@@ -3870,18 +4433,18 @@
         </p:nvSpPr>
         <p:spPr>
           <a:xfrm>
-            <a:off x="0" y="4094922"/>
-            <a:ext cx="12404035" cy="416438"/>
+            <a:off x="1312897" y="612361"/>
+            <a:ext cx="1695780" cy="754468"/>
           </a:xfrm>
           <a:prstGeom prst="rect">
             <a:avLst/>
           </a:prstGeom>
           <a:solidFill>
-            <a:srgbClr val="0B293A"/>
+            <a:srgbClr val="FFFFFF"/>
           </a:solidFill>
           <a:ln>
             <a:solidFill>
-              <a:srgbClr val="0B293A"/>
+              <a:srgbClr val="FFFFFF"/>
             </a:solidFill>
           </a:ln>
         </p:spPr>
@@ -3912,10 +4475,10 @@
       </p:sp>
       <p:sp>
         <p:nvSpPr>
-          <p:cNvPr id="10" name="Rectangle 9">
-            <a:extLst>
-              <a:ext uri="{FF2B5EF4-FFF2-40B4-BE49-F238E27FC236}">
-                <a16:creationId xmlns:a16="http://schemas.microsoft.com/office/drawing/2014/main" id="{C7A0B2C1-C63A-E5E8-BAC5-0F8F5C5735C0}"/>
+          <p:cNvPr id="12" name="Moon 11">
+            <a:extLst>
+              <a:ext uri="{FF2B5EF4-FFF2-40B4-BE49-F238E27FC236}">
+                <a16:creationId xmlns:a16="http://schemas.microsoft.com/office/drawing/2014/main" id="{5246EB26-638F-F204-088E-29E3D0F05E13}"/>
               </a:ext>
             </a:extLst>
           </p:cNvPr>
@@ -3923,12 +4486,14 @@
           <p:nvPr/>
         </p:nvSpPr>
         <p:spPr>
-          <a:xfrm>
-            <a:off x="3955037" y="927829"/>
-            <a:ext cx="3706749" cy="424721"/>
-          </a:xfrm>
-          <a:prstGeom prst="rect">
-            <a:avLst/>
+          <a:xfrm rot="13149936">
+            <a:off x="3066505" y="3084366"/>
+            <a:ext cx="337105" cy="644813"/>
+          </a:xfrm>
+          <a:prstGeom prst="moon">
+            <a:avLst>
+              <a:gd name="adj" fmla="val 65675"/>
+            </a:avLst>
           </a:prstGeom>
           <a:solidFill>
             <a:srgbClr val="FFFFFF"/>
@@ -3966,10 +4531,10 @@
       </p:sp>
       <p:sp>
         <p:nvSpPr>
-          <p:cNvPr id="11" name="Rectangle 10">
-            <a:extLst>
-              <a:ext uri="{FF2B5EF4-FFF2-40B4-BE49-F238E27FC236}">
-                <a16:creationId xmlns:a16="http://schemas.microsoft.com/office/drawing/2014/main" id="{F313D2E1-5F74-ACFD-353C-5305C80415C8}"/>
+          <p:cNvPr id="13" name="Moon 12">
+            <a:extLst>
+              <a:ext uri="{FF2B5EF4-FFF2-40B4-BE49-F238E27FC236}">
+                <a16:creationId xmlns:a16="http://schemas.microsoft.com/office/drawing/2014/main" id="{C69EF568-B92A-449D-00B0-3AC4A6F3C864}"/>
               </a:ext>
             </a:extLst>
           </p:cNvPr>
@@ -3977,12 +4542,14 @@
           <p:nvPr/>
         </p:nvSpPr>
         <p:spPr>
-          <a:xfrm>
-            <a:off x="1087394" y="1292589"/>
-            <a:ext cx="3706749" cy="424721"/>
-          </a:xfrm>
-          <a:prstGeom prst="rect">
-            <a:avLst/>
+          <a:xfrm rot="18490235">
+            <a:off x="1036337" y="3166239"/>
+            <a:ext cx="337105" cy="644813"/>
+          </a:xfrm>
+          <a:prstGeom prst="moon">
+            <a:avLst>
+              <a:gd name="adj" fmla="val 65675"/>
+            </a:avLst>
           </a:prstGeom>
           <a:solidFill>
             <a:srgbClr val="FFFFFF"/>
@@ -4020,10 +4587,10 @@
       </p:sp>
       <p:sp>
         <p:nvSpPr>
-          <p:cNvPr id="12" name="Rectangle 11">
-            <a:extLst>
-              <a:ext uri="{FF2B5EF4-FFF2-40B4-BE49-F238E27FC236}">
-                <a16:creationId xmlns:a16="http://schemas.microsoft.com/office/drawing/2014/main" id="{8DC399F0-634A-0894-0C69-3871E8E982A8}"/>
+          <p:cNvPr id="14" name="Rectangle 13">
+            <a:extLst>
+              <a:ext uri="{FF2B5EF4-FFF2-40B4-BE49-F238E27FC236}">
+                <a16:creationId xmlns:a16="http://schemas.microsoft.com/office/drawing/2014/main" id="{5D65ED78-864E-918E-8303-E5BAD4FC9B4F}"/>
               </a:ext>
             </a:extLst>
           </p:cNvPr>
@@ -4032,8 +4599,8 @@
         </p:nvSpPr>
         <p:spPr>
           <a:xfrm>
-            <a:off x="6743405" y="1283697"/>
-            <a:ext cx="3706749" cy="424721"/>
+            <a:off x="999656" y="3552826"/>
+            <a:ext cx="2080428" cy="613692"/>
           </a:xfrm>
           <a:prstGeom prst="rect">
             <a:avLst/>
@@ -4072,6 +4639,601 @@
           </a:p>
         </p:txBody>
       </p:sp>
+    </p:spTree>
+    <p:extLst>
+      <p:ext uri="{BB962C8B-B14F-4D97-AF65-F5344CB8AC3E}">
+        <p14:creationId xmlns:p14="http://schemas.microsoft.com/office/powerpoint/2010/main" val="1918144811"/>
+      </p:ext>
+    </p:extLst>
+  </p:cSld>
+  <p:clrMapOvr>
+    <a:masterClrMapping/>
+  </p:clrMapOvr>
+</p:sld>
+</file>
+
+<file path=ppt/slides/slide4.xml><?xml version="1.0" encoding="utf-8"?>
+<p:sld xmlns:a="http://schemas.openxmlformats.org/drawingml/2006/main" xmlns:r="http://schemas.openxmlformats.org/officeDocument/2006/relationships" xmlns:p="http://schemas.openxmlformats.org/presentationml/2006/main">
+  <p:cSld>
+    <p:bg>
+      <p:bgPr>
+        <a:solidFill>
+          <a:srgbClr val="FFFFFF"/>
+        </a:solidFill>
+        <a:effectLst/>
+      </p:bgPr>
+    </p:bg>
+    <p:spTree>
+      <p:nvGrpSpPr>
+        <p:cNvPr id="1" name=""/>
+        <p:cNvGrpSpPr/>
+        <p:nvPr/>
+      </p:nvGrpSpPr>
+      <p:grpSpPr>
+        <a:xfrm>
+          <a:off x="0" y="0"/>
+          <a:ext cx="0" cy="0"/>
+          <a:chOff x="0" y="0"/>
+          <a:chExt cx="0" cy="0"/>
+        </a:xfrm>
+      </p:grpSpPr>
+      <p:pic>
+        <p:nvPicPr>
+          <p:cNvPr id="5" name="Picture 4" descr="A logo of a tree&#10;&#10;Description automatically generated">
+            <a:extLst>
+              <a:ext uri="{FF2B5EF4-FFF2-40B4-BE49-F238E27FC236}">
+                <a16:creationId xmlns:a16="http://schemas.microsoft.com/office/drawing/2014/main" id="{0AA52284-72D3-3DA1-D1AD-F4867EF202DC}"/>
+              </a:ext>
+            </a:extLst>
+          </p:cNvPr>
+          <p:cNvPicPr>
+            <a:picLocks noChangeAspect="1"/>
+          </p:cNvPicPr>
+          <p:nvPr/>
+        </p:nvPicPr>
+        <p:blipFill rotWithShape="1">
+          <a:blip r:embed="rId2"/>
+          <a:srcRect l="23814" t="23063" r="23754" b="22523"/>
+          <a:stretch/>
+        </p:blipFill>
+        <p:spPr>
+          <a:xfrm>
+            <a:off x="4014672" y="1039565"/>
+            <a:ext cx="3659583" cy="3797916"/>
+          </a:xfrm>
+          <a:prstGeom prst="rect">
+            <a:avLst/>
+          </a:prstGeom>
+        </p:spPr>
+      </p:pic>
+      <p:sp>
+        <p:nvSpPr>
+          <p:cNvPr id="6" name="TextBox 5">
+            <a:extLst>
+              <a:ext uri="{FF2B5EF4-FFF2-40B4-BE49-F238E27FC236}">
+                <a16:creationId xmlns:a16="http://schemas.microsoft.com/office/drawing/2014/main" id="{8A605B8A-8FCF-CF26-F2A0-0165EB3ABA1E}"/>
+              </a:ext>
+            </a:extLst>
+          </p:cNvPr>
+          <p:cNvSpPr txBox="1"/>
+          <p:nvPr/>
+        </p:nvSpPr>
+        <p:spPr>
+          <a:xfrm>
+            <a:off x="3360310" y="4710439"/>
+            <a:ext cx="5149379" cy="1107996"/>
+          </a:xfrm>
+          <a:prstGeom prst="rect">
+            <a:avLst/>
+          </a:prstGeom>
+          <a:noFill/>
+        </p:spPr>
+        <p:txBody>
+          <a:bodyPr wrap="square" rtlCol="0">
+            <a:spAutoFit/>
+          </a:bodyPr>
+          <a:lstStyle/>
+          <a:p>
+            <a:r>
+              <a:rPr lang="en-AU" sz="6600" b="1" i="0" u="none" strike="noStrike" dirty="0">
+                <a:solidFill>
+                  <a:srgbClr val="FFFFFF"/>
+                </a:solidFill>
+                <a:effectLst/>
+                <a:latin typeface="Comfortaa variant0"/>
+              </a:rPr>
+              <a:t>GammaBayes</a:t>
+            </a:r>
+            <a:endParaRPr lang="en-AU" sz="6600" b="1" dirty="0">
+              <a:latin typeface="Aharoni" panose="02010803020104030203" pitchFamily="2" charset="-79"/>
+              <a:cs typeface="Aharoni" panose="02010803020104030203" pitchFamily="2" charset="-79"/>
+            </a:endParaRPr>
+          </a:p>
+        </p:txBody>
+      </p:sp>
+      <p:sp>
+        <p:nvSpPr>
+          <p:cNvPr id="8" name="TextBox 7">
+            <a:extLst>
+              <a:ext uri="{FF2B5EF4-FFF2-40B4-BE49-F238E27FC236}">
+                <a16:creationId xmlns:a16="http://schemas.microsoft.com/office/drawing/2014/main" id="{CF224A28-602E-36B7-5D48-60D9F346D186}"/>
+              </a:ext>
+            </a:extLst>
+          </p:cNvPr>
+          <p:cNvSpPr txBox="1"/>
+          <p:nvPr/>
+        </p:nvSpPr>
+        <p:spPr>
+          <a:xfrm>
+            <a:off x="1087394" y="6289589"/>
+            <a:ext cx="2594919" cy="369332"/>
+          </a:xfrm>
+          <a:prstGeom prst="rect">
+            <a:avLst/>
+          </a:prstGeom>
+          <a:noFill/>
+        </p:spPr>
+        <p:txBody>
+          <a:bodyPr wrap="square" rtlCol="0">
+            <a:spAutoFit/>
+          </a:bodyPr>
+          <a:lstStyle/>
+          <a:p>
+            <a:r>
+              <a:rPr lang="en-AU" b="0" i="0" u="none" strike="noStrike" dirty="0" err="1">
+                <a:solidFill>
+                  <a:srgbClr val="021031"/>
+                </a:solidFill>
+                <a:effectLst/>
+                <a:latin typeface="Google Sans"/>
+              </a:rPr>
+              <a:t>Comfortaa</a:t>
+            </a:r>
+            <a:r>
+              <a:rPr lang="en-AU" b="0" i="0" u="none" strike="noStrike" dirty="0">
+                <a:solidFill>
+                  <a:srgbClr val="021031"/>
+                </a:solidFill>
+                <a:effectLst/>
+                <a:latin typeface="Google Sans"/>
+              </a:rPr>
+              <a:t>, Bold 700</a:t>
+            </a:r>
+          </a:p>
+        </p:txBody>
+      </p:sp>
+      <p:sp>
+        <p:nvSpPr>
+          <p:cNvPr id="4" name="Rectangle 3">
+            <a:extLst>
+              <a:ext uri="{FF2B5EF4-FFF2-40B4-BE49-F238E27FC236}">
+                <a16:creationId xmlns:a16="http://schemas.microsoft.com/office/drawing/2014/main" id="{1102638D-74A3-D461-86EF-EC73CE03B7AE}"/>
+              </a:ext>
+            </a:extLst>
+          </p:cNvPr>
+          <p:cNvSpPr/>
+          <p:nvPr/>
+        </p:nvSpPr>
+        <p:spPr>
+          <a:xfrm>
+            <a:off x="-106018" y="4282880"/>
+            <a:ext cx="12404035" cy="308643"/>
+          </a:xfrm>
+          <a:prstGeom prst="rect">
+            <a:avLst/>
+          </a:prstGeom>
+          <a:solidFill>
+            <a:srgbClr val="B0C6D5"/>
+          </a:solidFill>
+          <a:ln>
+            <a:solidFill>
+              <a:srgbClr val="B0C6D5"/>
+            </a:solidFill>
+          </a:ln>
+        </p:spPr>
+        <p:style>
+          <a:lnRef idx="2">
+            <a:schemeClr val="accent1">
+              <a:shade val="15000"/>
+            </a:schemeClr>
+          </a:lnRef>
+          <a:fillRef idx="1">
+            <a:schemeClr val="accent1"/>
+          </a:fillRef>
+          <a:effectRef idx="0">
+            <a:schemeClr val="accent1"/>
+          </a:effectRef>
+          <a:fontRef idx="minor">
+            <a:schemeClr val="lt1"/>
+          </a:fontRef>
+        </p:style>
+        <p:txBody>
+          <a:bodyPr rtlCol="0" anchor="ctr"/>
+          <a:lstStyle/>
+          <a:p>
+            <a:pPr algn="ctr"/>
+            <a:endParaRPr lang="en-AU"/>
+          </a:p>
+        </p:txBody>
+      </p:sp>
+      <p:sp>
+        <p:nvSpPr>
+          <p:cNvPr id="2" name="Rectangle 1">
+            <a:extLst>
+              <a:ext uri="{FF2B5EF4-FFF2-40B4-BE49-F238E27FC236}">
+                <a16:creationId xmlns:a16="http://schemas.microsoft.com/office/drawing/2014/main" id="{7B55DEA1-4002-F8FA-949D-669C3E31D545}"/>
+              </a:ext>
+            </a:extLst>
+          </p:cNvPr>
+          <p:cNvSpPr/>
+          <p:nvPr/>
+        </p:nvSpPr>
+        <p:spPr>
+          <a:xfrm>
+            <a:off x="0" y="4472609"/>
+            <a:ext cx="12192000" cy="2385391"/>
+          </a:xfrm>
+          <a:prstGeom prst="rect">
+            <a:avLst/>
+          </a:prstGeom>
+          <a:solidFill>
+            <a:srgbClr val="0B293A"/>
+          </a:solidFill>
+          <a:ln>
+            <a:solidFill>
+              <a:srgbClr val="0B293A"/>
+            </a:solidFill>
+          </a:ln>
+        </p:spPr>
+        <p:style>
+          <a:lnRef idx="2">
+            <a:schemeClr val="accent1">
+              <a:shade val="15000"/>
+            </a:schemeClr>
+          </a:lnRef>
+          <a:fillRef idx="1">
+            <a:schemeClr val="accent1"/>
+          </a:fillRef>
+          <a:effectRef idx="0">
+            <a:schemeClr val="accent1"/>
+          </a:effectRef>
+          <a:fontRef idx="minor">
+            <a:schemeClr val="lt1"/>
+          </a:fontRef>
+        </p:style>
+        <p:txBody>
+          <a:bodyPr rtlCol="0" anchor="ctr"/>
+          <a:lstStyle/>
+          <a:p>
+            <a:pPr algn="ctr"/>
+            <a:endParaRPr lang="en-AU"/>
+          </a:p>
+        </p:txBody>
+      </p:sp>
+      <p:sp>
+        <p:nvSpPr>
+          <p:cNvPr id="7" name="Rectangle 6">
+            <a:extLst>
+              <a:ext uri="{FF2B5EF4-FFF2-40B4-BE49-F238E27FC236}">
+                <a16:creationId xmlns:a16="http://schemas.microsoft.com/office/drawing/2014/main" id="{2F660689-CEBC-9EB4-F822-29FCC21FFB0B}"/>
+              </a:ext>
+            </a:extLst>
+          </p:cNvPr>
+          <p:cNvSpPr/>
+          <p:nvPr/>
+        </p:nvSpPr>
+        <p:spPr>
+          <a:xfrm>
+            <a:off x="3802637" y="775429"/>
+            <a:ext cx="293113" cy="3319493"/>
+          </a:xfrm>
+          <a:prstGeom prst="rect">
+            <a:avLst/>
+          </a:prstGeom>
+          <a:solidFill>
+            <a:srgbClr val="FFFFFF"/>
+          </a:solidFill>
+          <a:ln>
+            <a:solidFill>
+              <a:srgbClr val="FFFFFF"/>
+            </a:solidFill>
+          </a:ln>
+        </p:spPr>
+        <p:style>
+          <a:lnRef idx="2">
+            <a:schemeClr val="accent1">
+              <a:shade val="15000"/>
+            </a:schemeClr>
+          </a:lnRef>
+          <a:fillRef idx="1">
+            <a:schemeClr val="accent1"/>
+          </a:fillRef>
+          <a:effectRef idx="0">
+            <a:schemeClr val="accent1"/>
+          </a:effectRef>
+          <a:fontRef idx="minor">
+            <a:schemeClr val="lt1"/>
+          </a:fontRef>
+        </p:style>
+        <p:txBody>
+          <a:bodyPr rtlCol="0" anchor="ctr"/>
+          <a:lstStyle/>
+          <a:p>
+            <a:pPr algn="ctr"/>
+            <a:endParaRPr lang="en-AU"/>
+          </a:p>
+        </p:txBody>
+      </p:sp>
+      <p:sp>
+        <p:nvSpPr>
+          <p:cNvPr id="9" name="Rectangle 8">
+            <a:extLst>
+              <a:ext uri="{FF2B5EF4-FFF2-40B4-BE49-F238E27FC236}">
+                <a16:creationId xmlns:a16="http://schemas.microsoft.com/office/drawing/2014/main" id="{20C27147-9955-42A9-DB93-A4DDADCA03C1}"/>
+              </a:ext>
+            </a:extLst>
+          </p:cNvPr>
+          <p:cNvSpPr/>
+          <p:nvPr/>
+        </p:nvSpPr>
+        <p:spPr>
+          <a:xfrm>
+            <a:off x="7580708" y="963387"/>
+            <a:ext cx="293113" cy="3319493"/>
+          </a:xfrm>
+          <a:prstGeom prst="rect">
+            <a:avLst/>
+          </a:prstGeom>
+          <a:solidFill>
+            <a:srgbClr val="FFFFFF"/>
+          </a:solidFill>
+          <a:ln>
+            <a:solidFill>
+              <a:srgbClr val="FFFFFF"/>
+            </a:solidFill>
+          </a:ln>
+        </p:spPr>
+        <p:style>
+          <a:lnRef idx="2">
+            <a:schemeClr val="accent1">
+              <a:shade val="15000"/>
+            </a:schemeClr>
+          </a:lnRef>
+          <a:fillRef idx="1">
+            <a:schemeClr val="accent1"/>
+          </a:fillRef>
+          <a:effectRef idx="0">
+            <a:schemeClr val="accent1"/>
+          </a:effectRef>
+          <a:fontRef idx="minor">
+            <a:schemeClr val="lt1"/>
+          </a:fontRef>
+        </p:style>
+        <p:txBody>
+          <a:bodyPr rtlCol="0" anchor="ctr"/>
+          <a:lstStyle/>
+          <a:p>
+            <a:pPr algn="ctr"/>
+            <a:endParaRPr lang="en-AU"/>
+          </a:p>
+        </p:txBody>
+      </p:sp>
+      <p:sp>
+        <p:nvSpPr>
+          <p:cNvPr id="3" name="Rectangle 2">
+            <a:extLst>
+              <a:ext uri="{FF2B5EF4-FFF2-40B4-BE49-F238E27FC236}">
+                <a16:creationId xmlns:a16="http://schemas.microsoft.com/office/drawing/2014/main" id="{804E0E71-722E-7F13-1E09-E64BD63E64B9}"/>
+              </a:ext>
+            </a:extLst>
+          </p:cNvPr>
+          <p:cNvSpPr/>
+          <p:nvPr/>
+        </p:nvSpPr>
+        <p:spPr>
+          <a:xfrm>
+            <a:off x="0" y="4094922"/>
+            <a:ext cx="12404035" cy="416438"/>
+          </a:xfrm>
+          <a:prstGeom prst="rect">
+            <a:avLst/>
+          </a:prstGeom>
+          <a:solidFill>
+            <a:srgbClr val="0B293A"/>
+          </a:solidFill>
+          <a:ln>
+            <a:solidFill>
+              <a:srgbClr val="0B293A"/>
+            </a:solidFill>
+          </a:ln>
+        </p:spPr>
+        <p:style>
+          <a:lnRef idx="2">
+            <a:schemeClr val="accent1">
+              <a:shade val="15000"/>
+            </a:schemeClr>
+          </a:lnRef>
+          <a:fillRef idx="1">
+            <a:schemeClr val="accent1"/>
+          </a:fillRef>
+          <a:effectRef idx="0">
+            <a:schemeClr val="accent1"/>
+          </a:effectRef>
+          <a:fontRef idx="minor">
+            <a:schemeClr val="lt1"/>
+          </a:fontRef>
+        </p:style>
+        <p:txBody>
+          <a:bodyPr rtlCol="0" anchor="ctr"/>
+          <a:lstStyle/>
+          <a:p>
+            <a:pPr algn="ctr"/>
+            <a:endParaRPr lang="en-AU"/>
+          </a:p>
+        </p:txBody>
+      </p:sp>
+      <p:sp>
+        <p:nvSpPr>
+          <p:cNvPr id="10" name="Rectangle 9">
+            <a:extLst>
+              <a:ext uri="{FF2B5EF4-FFF2-40B4-BE49-F238E27FC236}">
+                <a16:creationId xmlns:a16="http://schemas.microsoft.com/office/drawing/2014/main" id="{C7A0B2C1-C63A-E5E8-BAC5-0F8F5C5735C0}"/>
+              </a:ext>
+            </a:extLst>
+          </p:cNvPr>
+          <p:cNvSpPr/>
+          <p:nvPr/>
+        </p:nvSpPr>
+        <p:spPr>
+          <a:xfrm>
+            <a:off x="3955037" y="927829"/>
+            <a:ext cx="3706749" cy="424721"/>
+          </a:xfrm>
+          <a:prstGeom prst="rect">
+            <a:avLst/>
+          </a:prstGeom>
+          <a:solidFill>
+            <a:srgbClr val="FFFFFF"/>
+          </a:solidFill>
+          <a:ln>
+            <a:solidFill>
+              <a:srgbClr val="FFFFFF"/>
+            </a:solidFill>
+          </a:ln>
+        </p:spPr>
+        <p:style>
+          <a:lnRef idx="2">
+            <a:schemeClr val="accent1">
+              <a:shade val="15000"/>
+            </a:schemeClr>
+          </a:lnRef>
+          <a:fillRef idx="1">
+            <a:schemeClr val="accent1"/>
+          </a:fillRef>
+          <a:effectRef idx="0">
+            <a:schemeClr val="accent1"/>
+          </a:effectRef>
+          <a:fontRef idx="minor">
+            <a:schemeClr val="lt1"/>
+          </a:fontRef>
+        </p:style>
+        <p:txBody>
+          <a:bodyPr rtlCol="0" anchor="ctr"/>
+          <a:lstStyle/>
+          <a:p>
+            <a:pPr algn="ctr"/>
+            <a:endParaRPr lang="en-AU"/>
+          </a:p>
+        </p:txBody>
+      </p:sp>
+      <p:sp>
+        <p:nvSpPr>
+          <p:cNvPr id="11" name="Rectangle 10">
+            <a:extLst>
+              <a:ext uri="{FF2B5EF4-FFF2-40B4-BE49-F238E27FC236}">
+                <a16:creationId xmlns:a16="http://schemas.microsoft.com/office/drawing/2014/main" id="{F313D2E1-5F74-ACFD-353C-5305C80415C8}"/>
+              </a:ext>
+            </a:extLst>
+          </p:cNvPr>
+          <p:cNvSpPr/>
+          <p:nvPr/>
+        </p:nvSpPr>
+        <p:spPr>
+          <a:xfrm>
+            <a:off x="1087394" y="1292589"/>
+            <a:ext cx="3706749" cy="424721"/>
+          </a:xfrm>
+          <a:prstGeom prst="rect">
+            <a:avLst/>
+          </a:prstGeom>
+          <a:solidFill>
+            <a:srgbClr val="FFFFFF"/>
+          </a:solidFill>
+          <a:ln>
+            <a:solidFill>
+              <a:srgbClr val="FFFFFF"/>
+            </a:solidFill>
+          </a:ln>
+        </p:spPr>
+        <p:style>
+          <a:lnRef idx="2">
+            <a:schemeClr val="accent1">
+              <a:shade val="15000"/>
+            </a:schemeClr>
+          </a:lnRef>
+          <a:fillRef idx="1">
+            <a:schemeClr val="accent1"/>
+          </a:fillRef>
+          <a:effectRef idx="0">
+            <a:schemeClr val="accent1"/>
+          </a:effectRef>
+          <a:fontRef idx="minor">
+            <a:schemeClr val="lt1"/>
+          </a:fontRef>
+        </p:style>
+        <p:txBody>
+          <a:bodyPr rtlCol="0" anchor="ctr"/>
+          <a:lstStyle/>
+          <a:p>
+            <a:pPr algn="ctr"/>
+            <a:endParaRPr lang="en-AU"/>
+          </a:p>
+        </p:txBody>
+      </p:sp>
+      <p:sp>
+        <p:nvSpPr>
+          <p:cNvPr id="12" name="Rectangle 11">
+            <a:extLst>
+              <a:ext uri="{FF2B5EF4-FFF2-40B4-BE49-F238E27FC236}">
+                <a16:creationId xmlns:a16="http://schemas.microsoft.com/office/drawing/2014/main" id="{8DC399F0-634A-0894-0C69-3871E8E982A8}"/>
+              </a:ext>
+            </a:extLst>
+          </p:cNvPr>
+          <p:cNvSpPr/>
+          <p:nvPr/>
+        </p:nvSpPr>
+        <p:spPr>
+          <a:xfrm>
+            <a:off x="6743405" y="1283697"/>
+            <a:ext cx="3706749" cy="424721"/>
+          </a:xfrm>
+          <a:prstGeom prst="rect">
+            <a:avLst/>
+          </a:prstGeom>
+          <a:solidFill>
+            <a:srgbClr val="FFFFFF"/>
+          </a:solidFill>
+          <a:ln>
+            <a:solidFill>
+              <a:srgbClr val="FFFFFF"/>
+            </a:solidFill>
+          </a:ln>
+        </p:spPr>
+        <p:style>
+          <a:lnRef idx="2">
+            <a:schemeClr val="accent1">
+              <a:shade val="15000"/>
+            </a:schemeClr>
+          </a:lnRef>
+          <a:fillRef idx="1">
+            <a:schemeClr val="accent1"/>
+          </a:fillRef>
+          <a:effectRef idx="0">
+            <a:schemeClr val="accent1"/>
+          </a:effectRef>
+          <a:fontRef idx="minor">
+            <a:schemeClr val="lt1"/>
+          </a:fontRef>
+        </p:style>
+        <p:txBody>
+          <a:bodyPr rtlCol="0" anchor="ctr"/>
+          <a:lstStyle/>
+          <a:p>
+            <a:pPr algn="ctr"/>
+            <a:endParaRPr lang="en-AU"/>
+          </a:p>
+        </p:txBody>
+      </p:sp>
       <p:sp>
         <p:nvSpPr>
           <p:cNvPr id="13" name="TextBox 12">
@@ -4130,7 +5292,7 @@
 </p:sld>
 </file>
 
-<file path=ppt/slides/slide3.xml><?xml version="1.0" encoding="utf-8"?>
+<file path=ppt/slides/slide5.xml><?xml version="1.0" encoding="utf-8"?>
 <p:sld xmlns:a="http://schemas.openxmlformats.org/drawingml/2006/main" xmlns:r="http://schemas.openxmlformats.org/officeDocument/2006/relationships" xmlns:p="http://schemas.openxmlformats.org/presentationml/2006/main">
   <p:cSld>
     <p:spTree>

</xml_diff>